<commit_message>
Update Maxwell Cates Huff Grad Symposium 22.pptx
</commit_message>
<xml_diff>
--- a/3 Presentations/Maxwell Cates Huff Grad Symposium 22.pptx
+++ b/3 Presentations/Maxwell Cates Huff Grad Symposium 22.pptx
@@ -3770,7 +3770,7 @@
           <a:p>
             <a:fld id="{F89EB53A-D084-41C5-9A8B-A1FAC49C431B}" type="datetimeFigureOut">
               <a:rPr lang="en-US" smtClean="0"/>
-              <a:t>4/12/2022</a:t>
+              <a:t>4/13/2022</a:t>
             </a:fld>
             <a:endParaRPr lang="en-US"/>
           </a:p>
@@ -5075,7 +5075,7 @@
           <a:p>
             <a:fld id="{93E14293-46C5-43E5-BF5E-27CF5FE20FFA}" type="datetime1">
               <a:rPr lang="en-US" smtClean="0"/>
-              <a:t>4/12/2022</a:t>
+              <a:t>4/13/2022</a:t>
             </a:fld>
             <a:endParaRPr lang="en-US"/>
           </a:p>
@@ -5245,7 +5245,7 @@
           <a:p>
             <a:fld id="{1958DE41-28B7-4A91-A503-51F9A94368DA}" type="datetime1">
               <a:rPr lang="en-US" smtClean="0"/>
-              <a:t>4/12/2022</a:t>
+              <a:t>4/13/2022</a:t>
             </a:fld>
             <a:endParaRPr lang="en-US"/>
           </a:p>
@@ -5425,7 +5425,7 @@
           <a:p>
             <a:fld id="{AA4F1501-5F8C-4632-87DA-0832EEF921CE}" type="datetime1">
               <a:rPr lang="en-US" smtClean="0"/>
-              <a:t>4/12/2022</a:t>
+              <a:t>4/13/2022</a:t>
             </a:fld>
             <a:endParaRPr lang="en-US"/>
           </a:p>
@@ -5633,7 +5633,7 @@
           <a:p>
             <a:fld id="{18215309-3104-4CF5-BE5B-A79D0C8ACAD0}" type="datetime1">
               <a:rPr lang="en-US" smtClean="0"/>
-              <a:t>4/12/2022</a:t>
+              <a:t>4/13/2022</a:t>
             </a:fld>
             <a:endParaRPr lang="en-US" dirty="0"/>
           </a:p>
@@ -5832,7 +5832,7 @@
           <a:p>
             <a:fld id="{C9FF8F65-3824-4E5A-B95F-97CC4353E029}" type="datetime1">
               <a:rPr lang="en-US" smtClean="0"/>
-              <a:t>4/12/2022</a:t>
+              <a:t>4/13/2022</a:t>
             </a:fld>
             <a:endParaRPr lang="en-US" dirty="0"/>
           </a:p>
@@ -6116,7 +6116,7 @@
           <a:p>
             <a:fld id="{B11A333C-45F9-46DC-9280-E6426344E7D0}" type="datetime1">
               <a:rPr lang="en-US" smtClean="0"/>
-              <a:t>4/12/2022</a:t>
+              <a:t>4/13/2022</a:t>
             </a:fld>
             <a:endParaRPr lang="en-US" dirty="0"/>
           </a:p>
@@ -6382,7 +6382,7 @@
           <a:p>
             <a:fld id="{D432EE20-3470-470D-8E6A-40648FDA9A18}" type="datetime1">
               <a:rPr lang="en-US" smtClean="0"/>
-              <a:t>4/12/2022</a:t>
+              <a:t>4/13/2022</a:t>
             </a:fld>
             <a:endParaRPr lang="en-US" dirty="0"/>
           </a:p>
@@ -6795,7 +6795,7 @@
           <a:p>
             <a:fld id="{2B2A7EF2-888F-45F9-899F-23ABBFAF4F6C}" type="datetime1">
               <a:rPr lang="en-US" smtClean="0"/>
-              <a:t>4/12/2022</a:t>
+              <a:t>4/13/2022</a:t>
             </a:fld>
             <a:endParaRPr lang="en-US" dirty="0"/>
           </a:p>
@@ -6937,7 +6937,7 @@
           <a:p>
             <a:fld id="{DD877D00-4FED-409D-B0DE-45F91B2CF28B}" type="datetime1">
               <a:rPr lang="en-US" smtClean="0"/>
-              <a:t>4/12/2022</a:t>
+              <a:t>4/13/2022</a:t>
             </a:fld>
             <a:endParaRPr lang="en-US" dirty="0"/>
           </a:p>
@@ -7051,7 +7051,7 @@
           <a:p>
             <a:fld id="{25793418-A853-439A-A9D7-B894A0A4CB02}" type="datetime1">
               <a:rPr lang="en-US" smtClean="0"/>
-              <a:t>4/12/2022</a:t>
+              <a:t>4/13/2022</a:t>
             </a:fld>
             <a:endParaRPr lang="en-US" dirty="0"/>
           </a:p>
@@ -7363,7 +7363,7 @@
           <a:p>
             <a:fld id="{D5AB02AE-EDB9-47C9-BFE6-63C749A1F0FB}" type="datetime1">
               <a:rPr lang="en-US" smtClean="0"/>
-              <a:t>4/12/2022</a:t>
+              <a:t>4/13/2022</a:t>
             </a:fld>
             <a:endParaRPr lang="en-US" dirty="0"/>
           </a:p>
@@ -7546,7 +7546,7 @@
           <a:p>
             <a:fld id="{CA268D7B-4BF3-48F7-9EBF-F02F9DB27759}" type="datetime1">
               <a:rPr lang="en-US" smtClean="0"/>
-              <a:t>4/12/2022</a:t>
+              <a:t>4/13/2022</a:t>
             </a:fld>
             <a:endParaRPr lang="en-US"/>
           </a:p>
@@ -7822,7 +7822,7 @@
           <a:p>
             <a:fld id="{C3F5009C-B070-44EF-83A3-763E0DB7421E}" type="datetime1">
               <a:rPr lang="en-US" smtClean="0"/>
-              <a:t>4/12/2022</a:t>
+              <a:t>4/13/2022</a:t>
             </a:fld>
             <a:endParaRPr lang="en-US" dirty="0"/>
           </a:p>
@@ -8021,7 +8021,7 @@
           <a:p>
             <a:fld id="{9722D855-6B61-4243-8BBD-BCF06865339F}" type="datetime1">
               <a:rPr lang="en-US" smtClean="0"/>
-              <a:t>4/12/2022</a:t>
+              <a:t>4/13/2022</a:t>
             </a:fld>
             <a:endParaRPr lang="en-US" dirty="0"/>
           </a:p>
@@ -8230,7 +8230,7 @@
           <a:p>
             <a:fld id="{4AFB435B-5DF1-4DB0-93B6-A8BA160945D1}" type="datetime1">
               <a:rPr lang="en-US" smtClean="0"/>
-              <a:t>4/12/2022</a:t>
+              <a:t>4/13/2022</a:t>
             </a:fld>
             <a:endParaRPr lang="en-US" dirty="0"/>
           </a:p>
@@ -8487,7 +8487,7 @@
           <a:p>
             <a:fld id="{48332C65-DCCD-4A10-B3E5-AFD75F3BB18C}" type="datetime1">
               <a:rPr lang="en-US" smtClean="0"/>
-              <a:t>4/12/2022</a:t>
+              <a:t>4/13/2022</a:t>
             </a:fld>
             <a:endParaRPr lang="en-US"/>
           </a:p>
@@ -8719,7 +8719,7 @@
           <a:p>
             <a:fld id="{A2BFDCB7-33BB-4BEF-BFA2-F3F5DB32250F}" type="datetime1">
               <a:rPr lang="en-US" smtClean="0"/>
-              <a:t>4/12/2022</a:t>
+              <a:t>4/13/2022</a:t>
             </a:fld>
             <a:endParaRPr lang="en-US"/>
           </a:p>
@@ -9086,7 +9086,7 @@
           <a:p>
             <a:fld id="{298A7E69-B68C-4C8E-AAF4-B2F965D1C3C8}" type="datetime1">
               <a:rPr lang="en-US" smtClean="0"/>
-              <a:t>4/12/2022</a:t>
+              <a:t>4/13/2022</a:t>
             </a:fld>
             <a:endParaRPr lang="en-US"/>
           </a:p>
@@ -9204,7 +9204,7 @@
           <a:p>
             <a:fld id="{7F64DB2B-65E3-4342-A77B-6A420C3C5736}" type="datetime1">
               <a:rPr lang="en-US" smtClean="0"/>
-              <a:t>4/12/2022</a:t>
+              <a:t>4/13/2022</a:t>
             </a:fld>
             <a:endParaRPr lang="en-US"/>
           </a:p>
@@ -9299,7 +9299,7 @@
           <a:p>
             <a:fld id="{3464816F-1FFE-42EF-BAE0-F1C7A320D0F7}" type="datetime1">
               <a:rPr lang="en-US" smtClean="0"/>
-              <a:t>4/12/2022</a:t>
+              <a:t>4/13/2022</a:t>
             </a:fld>
             <a:endParaRPr lang="en-US"/>
           </a:p>
@@ -9576,7 +9576,7 @@
           <a:p>
             <a:fld id="{4E00CDDC-C01B-4A9F-9C78-6D76A8DF70B6}" type="datetime1">
               <a:rPr lang="en-US" smtClean="0"/>
-              <a:t>4/12/2022</a:t>
+              <a:t>4/13/2022</a:t>
             </a:fld>
             <a:endParaRPr lang="en-US"/>
           </a:p>
@@ -9833,7 +9833,7 @@
           <a:p>
             <a:fld id="{9C893E38-9F72-44CD-9B3A-392A9BED1095}" type="datetime1">
               <a:rPr lang="en-US" smtClean="0"/>
-              <a:t>4/12/2022</a:t>
+              <a:t>4/13/2022</a:t>
             </a:fld>
             <a:endParaRPr lang="en-US"/>
           </a:p>
@@ -10046,7 +10046,7 @@
           <a:p>
             <a:fld id="{D3894932-5BA1-4262-A72E-88E6E9D3CD15}" type="datetime1">
               <a:rPr lang="en-US" smtClean="0"/>
-              <a:t>4/12/2022</a:t>
+              <a:t>4/13/2022</a:t>
             </a:fld>
             <a:endParaRPr lang="en-US"/>
           </a:p>
@@ -10603,7 +10603,7 @@
           <a:p>
             <a:fld id="{6104A50E-2517-4376-A517-8272C588B969}" type="datetime1">
               <a:rPr lang="en-US" smtClean="0"/>
-              <a:t>4/12/2022</a:t>
+              <a:t>4/13/2022</a:t>
             </a:fld>
             <a:endParaRPr lang="en-US" dirty="0"/>
           </a:p>
@@ -12685,45 +12685,57 @@
             <a:pPr lvl="1"/>
             <a:r>
               <a:rPr lang="en-US" sz="2000" dirty="0"/>
-              <a:t>Item-specific (</a:t>
-            </a:r>
-            <a:r>
-              <a:rPr lang="en-US" sz="2000" i="1" dirty="0"/>
+              <a:t>Item-specific (Think about how items are unique; </a:t>
+            </a:r>
+            <a:r>
+              <a:rPr lang="en-US" sz="2000" b="1" i="1" dirty="0"/>
               <a:t>n</a:t>
             </a:r>
             <a:r>
+              <a:rPr lang="en-US" sz="2000" b="1" dirty="0"/>
+              <a:t> = 29</a:t>
+            </a:r>
+            <a:r>
               <a:rPr lang="en-US" sz="2000" dirty="0"/>
-              <a:t> = 29)</a:t>
+              <a:t>)</a:t>
             </a:r>
           </a:p>
           <a:p>
             <a:pPr lvl="1"/>
             <a:r>
               <a:rPr lang="en-US" sz="2000" dirty="0"/>
-              <a:t>Relational (</a:t>
-            </a:r>
-            <a:r>
-              <a:rPr lang="en-US" sz="2000" i="1" dirty="0"/>
+              <a:t>Relational (Think about how items are related; </a:t>
+            </a:r>
+            <a:r>
+              <a:rPr lang="en-US" sz="2000" b="1" i="1" dirty="0"/>
               <a:t>n</a:t>
             </a:r>
             <a:r>
+              <a:rPr lang="en-US" sz="2000" b="1" dirty="0"/>
+              <a:t> = 31</a:t>
+            </a:r>
+            <a:r>
               <a:rPr lang="en-US" sz="2000" dirty="0"/>
-              <a:t> = 31)</a:t>
+              <a:t>)</a:t>
             </a:r>
           </a:p>
           <a:p>
             <a:pPr lvl="1"/>
             <a:r>
               <a:rPr lang="en-US" sz="2000" dirty="0"/>
-              <a:t>Control Group (</a:t>
-            </a:r>
-            <a:r>
-              <a:rPr lang="en-US" sz="2000" i="1" dirty="0"/>
+              <a:t>Control Group (Silent Reading; </a:t>
+            </a:r>
+            <a:r>
+              <a:rPr lang="en-US" sz="2000" b="1" i="1" dirty="0"/>
               <a:t>n</a:t>
             </a:r>
             <a:r>
+              <a:rPr lang="en-US" sz="2000" b="1" dirty="0"/>
+              <a:t> = 28</a:t>
+            </a:r>
+            <a:r>
               <a:rPr lang="en-US" sz="2000" dirty="0"/>
-              <a:t> = 28)</a:t>
+              <a:t>)</a:t>
             </a:r>
           </a:p>
           <a:p>
@@ -18782,6 +18794,13 @@
             </a:r>
           </a:p>
           <a:p>
+            <a:pPr lvl="1"/>
+            <a:r>
+              <a:rPr lang="en-US" sz="2000" dirty="0"/>
+              <a:t>Memory predictions don’t match actual memory!</a:t>
+            </a:r>
+          </a:p>
+          <a:p>
             <a:pPr marL="0" indent="0">
               <a:buNone/>
             </a:pPr>
@@ -18832,6 +18851,11 @@
               </a:rPr>
               <a:t> &amp; Bjork, 2005)</a:t>
             </a:r>
+            <a:endParaRPr lang="en-US" sz="1500" dirty="0">
+              <a:solidFill>
+                <a:schemeClr val="tx1"/>
+              </a:solidFill>
+            </a:endParaRPr>
           </a:p>
           <a:p>
             <a:endParaRPr lang="en-US" sz="1400" dirty="0">
@@ -19061,15 +19085,33 @@
                                   </p:childTnLst>
                                 </p:cTn>
                               </p:par>
+                            </p:childTnLst>
+                          </p:cTn>
+                        </p:par>
+                      </p:childTnLst>
+                    </p:cTn>
+                  </p:par>
+                  <p:par>
+                    <p:cTn id="11" fill="hold">
+                      <p:stCondLst>
+                        <p:cond delay="indefinite"/>
+                      </p:stCondLst>
+                      <p:childTnLst>
+                        <p:par>
+                          <p:cTn id="12" fill="hold">
+                            <p:stCondLst>
+                              <p:cond delay="0"/>
+                            </p:stCondLst>
+                            <p:childTnLst>
                               <p:par>
-                                <p:cTn id="11" presetID="1" presetClass="entr" presetSubtype="0" fill="hold" grpId="0" nodeType="withEffect">
+                                <p:cTn id="13" presetID="1" presetClass="entr" presetSubtype="0" fill="hold" nodeType="clickEffect">
                                   <p:stCondLst>
                                     <p:cond delay="0"/>
                                   </p:stCondLst>
                                   <p:childTnLst>
                                     <p:set>
                                       <p:cBhvr>
-                                        <p:cTn id="12" dur="1" fill="hold">
+                                        <p:cTn id="14" dur="1" fill="hold">
                                           <p:stCondLst>
                                             <p:cond delay="0"/>
                                           </p:stCondLst>
@@ -19092,26 +19134,8 @@
                                   </p:childTnLst>
                                 </p:cTn>
                               </p:par>
-                            </p:childTnLst>
-                          </p:cTn>
-                        </p:par>
-                      </p:childTnLst>
-                    </p:cTn>
-                  </p:par>
-                  <p:par>
-                    <p:cTn id="13" fill="hold">
-                      <p:stCondLst>
-                        <p:cond delay="indefinite"/>
-                      </p:stCondLst>
-                      <p:childTnLst>
-                        <p:par>
-                          <p:cTn id="14" fill="hold">
-                            <p:stCondLst>
-                              <p:cond delay="0"/>
-                            </p:stCondLst>
-                            <p:childTnLst>
                               <p:par>
-                                <p:cTn id="15" presetID="1" presetClass="entr" presetSubtype="0" fill="hold" grpId="0" nodeType="clickEffect">
+                                <p:cTn id="15" presetID="1" presetClass="entr" presetSubtype="0" fill="hold" nodeType="withEffect">
                                   <p:stCondLst>
                                     <p:cond delay="0"/>
                                   </p:stCondLst>
@@ -19126,7 +19150,56 @@
                                         <p:tgtEl>
                                           <p:spTgt spid="3">
                                             <p:txEl>
-                                              <p:pRg st="6" end="6"/>
+                                              <p:pRg st="5" end="5"/>
+                                            </p:txEl>
+                                          </p:spTgt>
+                                        </p:tgtEl>
+                                        <p:attrNameLst>
+                                          <p:attrName>style.visibility</p:attrName>
+                                        </p:attrNameLst>
+                                      </p:cBhvr>
+                                      <p:to>
+                                        <p:strVal val="visible"/>
+                                      </p:to>
+                                    </p:set>
+                                  </p:childTnLst>
+                                </p:cTn>
+                              </p:par>
+                            </p:childTnLst>
+                          </p:cTn>
+                        </p:par>
+                      </p:childTnLst>
+                    </p:cTn>
+                  </p:par>
+                  <p:par>
+                    <p:cTn id="17" fill="hold">
+                      <p:stCondLst>
+                        <p:cond delay="indefinite"/>
+                      </p:stCondLst>
+                      <p:childTnLst>
+                        <p:par>
+                          <p:cTn id="18" fill="hold">
+                            <p:stCondLst>
+                              <p:cond delay="0"/>
+                            </p:stCondLst>
+                            <p:childTnLst>
+                              <p:par>
+                                <p:cTn id="19" presetID="1" presetClass="entr" presetSubtype="0" fill="hold" nodeType="clickEffect">
+                                  <p:stCondLst>
+                                    <p:cond delay="0"/>
+                                  </p:stCondLst>
+                                  <p:childTnLst>
+                                    <p:set>
+                                      <p:cBhvr>
+                                        <p:cTn id="20" dur="1" fill="hold">
+                                          <p:stCondLst>
+                                            <p:cond delay="0"/>
+                                          </p:stCondLst>
+                                        </p:cTn>
+                                        <p:tgtEl>
+                                          <p:spTgt spid="3">
+                                            <p:txEl>
+                                              <p:pRg st="7" end="7"/>
                                             </p:txEl>
                                           </p:spTgt>
                                         </p:tgtEl>

</xml_diff>